<commit_message>
Toevoegen 3D ontwerpen button en buttonbox
</commit_message>
<xml_diff>
--- a/src/poster.pptx
+++ b/src/poster.pptx
@@ -1082,6 +1082,14 @@
               </a:rPr>
               <a:t>Experience</a:t>
             </a:r>
+            <a:r>
+              <a:rPr lang="nl-BE" sz="6000" dirty="0">
+                <a:solidFill>
+                  <a:srgbClr val="E00020"/>
+                </a:solidFill>
+              </a:rPr>
+              <a:t> </a:t>
+            </a:r>
             <a:br>
               <a:rPr lang="nl-BE" sz="6000" dirty="0">
                 <a:solidFill>
@@ -1169,17 +1177,7 @@
                 <a:effectLst/>
                 <a:latin typeface="+mj-lt"/>
               </a:rPr>
-              <a:t>" te </a:t>
-            </a:r>
-            <a:r>
-              <a:rPr lang="nl-NL" sz="4000" i="0" dirty="0" err="1">
-                <a:solidFill>
-                  <a:schemeClr val="accent3"/>
-                </a:solidFill>
-                <a:effectLst/>
-                <a:latin typeface="+mj-lt"/>
-              </a:rPr>
-              <a:t>creëeren</a:t>
+              <a:t>" te creëren</a:t>
             </a:r>
             <a:r>
               <a:rPr lang="nl-NL" sz="4000" dirty="0">
@@ -2839,14 +2837,12 @@
 </file>
 
 <file path=customXml/item1.xml><?xml version="1.0" encoding="utf-8"?>
-<p:properties xmlns:p="http://schemas.microsoft.com/office/2006/metadata/properties" xmlns:xsi="http://www.w3.org/2001/XMLSchema-instance" xmlns:pc="http://schemas.microsoft.com/office/infopath/2007/PartnerControls">
-  <documentManagement>
-    <TaxCatchAll xmlns="f921bb7d-4033-42bd-968a-881fd459c073" xsi:nil="true"/>
-    <lcf76f155ced4ddcb4097134ff3c332f xmlns="7af3f08f-6b65-4c98-b033-853692dc00be">
-      <Terms xmlns="http://schemas.microsoft.com/office/infopath/2007/PartnerControls"/>
-    </lcf76f155ced4ddcb4097134ff3c332f>
-  </documentManagement>
-</p:properties>
+<?mso-contentType ?>
+<FormTemplates xmlns="http://schemas.microsoft.com/sharepoint/v3/contenttype/forms">
+  <Display>DocumentLibraryForm</Display>
+  <Edit>DocumentLibraryForm</Edit>
+  <New>DocumentLibraryForm</New>
+</FormTemplates>
 </file>
 
 <file path=customXml/item2.xml><?xml version="1.0" encoding="utf-8"?>
@@ -3057,27 +3053,20 @@
 </file>
 
 <file path=customXml/item3.xml><?xml version="1.0" encoding="utf-8"?>
-<?mso-contentType ?>
-<FormTemplates xmlns="http://schemas.microsoft.com/sharepoint/v3/contenttype/forms">
-  <Display>DocumentLibraryForm</Display>
-  <Edit>DocumentLibraryForm</Edit>
-  <New>DocumentLibraryForm</New>
-</FormTemplates>
+<p:properties xmlns:p="http://schemas.microsoft.com/office/2006/metadata/properties" xmlns:xsi="http://www.w3.org/2001/XMLSchema-instance" xmlns:pc="http://schemas.microsoft.com/office/infopath/2007/PartnerControls">
+  <documentManagement>
+    <TaxCatchAll xmlns="f921bb7d-4033-42bd-968a-881fd459c073" xsi:nil="true"/>
+    <lcf76f155ced4ddcb4097134ff3c332f xmlns="7af3f08f-6b65-4c98-b033-853692dc00be">
+      <Terms xmlns="http://schemas.microsoft.com/office/infopath/2007/PartnerControls"/>
+    </lcf76f155ced4ddcb4097134ff3c332f>
+  </documentManagement>
+</p:properties>
 </file>
 
 <file path=customXml/itemProps1.xml><?xml version="1.0" encoding="utf-8"?>
-<ds:datastoreItem xmlns:ds="http://schemas.openxmlformats.org/officeDocument/2006/customXml" ds:itemID="{B247EB90-66CA-4409-98FF-5024AA619E64}">
+<ds:datastoreItem xmlns:ds="http://schemas.openxmlformats.org/officeDocument/2006/customXml" ds:itemID="{E1FA04DA-A2C1-4A00-9FA4-1F6991DECE56}">
   <ds:schemaRefs>
-    <ds:schemaRef ds:uri="7af3f08f-6b65-4c98-b033-853692dc00be"/>
-    <ds:schemaRef ds:uri="f921bb7d-4033-42bd-968a-881fd459c073"/>
-    <ds:schemaRef ds:uri="http://purl.org/dc/dcmitype/"/>
-    <ds:schemaRef ds:uri="http://purl.org/dc/elements/1.1/"/>
-    <ds:schemaRef ds:uri="http://purl.org/dc/terms/"/>
-    <ds:schemaRef ds:uri="http://schemas.microsoft.com/office/2006/documentManagement/types"/>
-    <ds:schemaRef ds:uri="http://schemas.microsoft.com/office/2006/metadata/properties"/>
-    <ds:schemaRef ds:uri="http://schemas.microsoft.com/office/infopath/2007/PartnerControls"/>
-    <ds:schemaRef ds:uri="http://schemas.openxmlformats.org/package/2006/metadata/core-properties"/>
-    <ds:schemaRef ds:uri="http://www.w3.org/XML/1998/namespace"/>
+    <ds:schemaRef ds:uri="http://schemas.microsoft.com/sharepoint/v3/contenttype/forms"/>
   </ds:schemaRefs>
 </ds:datastoreItem>
 </file>
@@ -3102,9 +3091,18 @@
 </file>
 
 <file path=customXml/itemProps3.xml><?xml version="1.0" encoding="utf-8"?>
-<ds:datastoreItem xmlns:ds="http://schemas.openxmlformats.org/officeDocument/2006/customXml" ds:itemID="{E1FA04DA-A2C1-4A00-9FA4-1F6991DECE56}">
+<ds:datastoreItem xmlns:ds="http://schemas.openxmlformats.org/officeDocument/2006/customXml" ds:itemID="{B247EB90-66CA-4409-98FF-5024AA619E64}">
   <ds:schemaRefs>
-    <ds:schemaRef ds:uri="http://schemas.microsoft.com/sharepoint/v3/contenttype/forms"/>
+    <ds:schemaRef ds:uri="7af3f08f-6b65-4c98-b033-853692dc00be"/>
+    <ds:schemaRef ds:uri="f921bb7d-4033-42bd-968a-881fd459c073"/>
+    <ds:schemaRef ds:uri="http://purl.org/dc/dcmitype/"/>
+    <ds:schemaRef ds:uri="http://purl.org/dc/elements/1.1/"/>
+    <ds:schemaRef ds:uri="http://purl.org/dc/terms/"/>
+    <ds:schemaRef ds:uri="http://schemas.microsoft.com/office/2006/documentManagement/types"/>
+    <ds:schemaRef ds:uri="http://schemas.microsoft.com/office/2006/metadata/properties"/>
+    <ds:schemaRef ds:uri="http://schemas.microsoft.com/office/infopath/2007/PartnerControls"/>
+    <ds:schemaRef ds:uri="http://schemas.openxmlformats.org/package/2006/metadata/core-properties"/>
+    <ds:schemaRef ds:uri="http://www.w3.org/XML/1998/namespace"/>
   </ds:schemaRefs>
 </ds:datastoreItem>
 </file>
</xml_diff>